<commit_message>
aggiunta search a titolo
</commit_message>
<xml_diff>
--- a/doc/Modello ER database fuemetti.pptx
+++ b/doc/Modello ER database fuemetti.pptx
@@ -271,7 +271,7 @@
           <a:p>
             <a:fld id="{088067D6-97EC-48D0-BD15-639A95900B20}" type="datetimeFigureOut">
               <a:rPr lang="it-IT" smtClean="0"/>
-              <a:t>02/07/2020</a:t>
+              <a:t>06/07/2020</a:t>
             </a:fld>
             <a:endParaRPr lang="it-IT"/>
           </a:p>
@@ -469,7 +469,7 @@
           <a:p>
             <a:fld id="{088067D6-97EC-48D0-BD15-639A95900B20}" type="datetimeFigureOut">
               <a:rPr lang="it-IT" smtClean="0"/>
-              <a:t>02/07/2020</a:t>
+              <a:t>06/07/2020</a:t>
             </a:fld>
             <a:endParaRPr lang="it-IT"/>
           </a:p>
@@ -677,7 +677,7 @@
           <a:p>
             <a:fld id="{088067D6-97EC-48D0-BD15-639A95900B20}" type="datetimeFigureOut">
               <a:rPr lang="it-IT" smtClean="0"/>
-              <a:t>02/07/2020</a:t>
+              <a:t>06/07/2020</a:t>
             </a:fld>
             <a:endParaRPr lang="it-IT"/>
           </a:p>
@@ -875,7 +875,7 @@
           <a:p>
             <a:fld id="{088067D6-97EC-48D0-BD15-639A95900B20}" type="datetimeFigureOut">
               <a:rPr lang="it-IT" smtClean="0"/>
-              <a:t>02/07/2020</a:t>
+              <a:t>06/07/2020</a:t>
             </a:fld>
             <a:endParaRPr lang="it-IT"/>
           </a:p>
@@ -1150,7 +1150,7 @@
           <a:p>
             <a:fld id="{088067D6-97EC-48D0-BD15-639A95900B20}" type="datetimeFigureOut">
               <a:rPr lang="it-IT" smtClean="0"/>
-              <a:t>02/07/2020</a:t>
+              <a:t>06/07/2020</a:t>
             </a:fld>
             <a:endParaRPr lang="it-IT"/>
           </a:p>
@@ -1415,7 +1415,7 @@
           <a:p>
             <a:fld id="{088067D6-97EC-48D0-BD15-639A95900B20}" type="datetimeFigureOut">
               <a:rPr lang="it-IT" smtClean="0"/>
-              <a:t>02/07/2020</a:t>
+              <a:t>06/07/2020</a:t>
             </a:fld>
             <a:endParaRPr lang="it-IT"/>
           </a:p>
@@ -1827,7 +1827,7 @@
           <a:p>
             <a:fld id="{088067D6-97EC-48D0-BD15-639A95900B20}" type="datetimeFigureOut">
               <a:rPr lang="it-IT" smtClean="0"/>
-              <a:t>02/07/2020</a:t>
+              <a:t>06/07/2020</a:t>
             </a:fld>
             <a:endParaRPr lang="it-IT"/>
           </a:p>
@@ -1968,7 +1968,7 @@
           <a:p>
             <a:fld id="{088067D6-97EC-48D0-BD15-639A95900B20}" type="datetimeFigureOut">
               <a:rPr lang="it-IT" smtClean="0"/>
-              <a:t>02/07/2020</a:t>
+              <a:t>06/07/2020</a:t>
             </a:fld>
             <a:endParaRPr lang="it-IT"/>
           </a:p>
@@ -2081,7 +2081,7 @@
           <a:p>
             <a:fld id="{088067D6-97EC-48D0-BD15-639A95900B20}" type="datetimeFigureOut">
               <a:rPr lang="it-IT" smtClean="0"/>
-              <a:t>02/07/2020</a:t>
+              <a:t>06/07/2020</a:t>
             </a:fld>
             <a:endParaRPr lang="it-IT"/>
           </a:p>
@@ -2392,7 +2392,7 @@
           <a:p>
             <a:fld id="{088067D6-97EC-48D0-BD15-639A95900B20}" type="datetimeFigureOut">
               <a:rPr lang="it-IT" smtClean="0"/>
-              <a:t>02/07/2020</a:t>
+              <a:t>06/07/2020</a:t>
             </a:fld>
             <a:endParaRPr lang="it-IT"/>
           </a:p>
@@ -2680,7 +2680,7 @@
           <a:p>
             <a:fld id="{088067D6-97EC-48D0-BD15-639A95900B20}" type="datetimeFigureOut">
               <a:rPr lang="it-IT" smtClean="0"/>
-              <a:t>02/07/2020</a:t>
+              <a:t>06/07/2020</a:t>
             </a:fld>
             <a:endParaRPr lang="it-IT"/>
           </a:p>
@@ -2921,7 +2921,7 @@
           <a:p>
             <a:fld id="{088067D6-97EC-48D0-BD15-639A95900B20}" type="datetimeFigureOut">
               <a:rPr lang="it-IT" smtClean="0"/>
-              <a:t>02/07/2020</a:t>
+              <a:t>06/07/2020</a:t>
             </a:fld>
             <a:endParaRPr lang="it-IT"/>
           </a:p>
@@ -4039,15 +4039,22 @@
           <a:p>
             <a:pPr algn="ctr"/>
             <a:r>
-              <a:rPr lang="it-IT" sz="1200" dirty="0">
+              <a:rPr lang="it-IT" sz="1200">
                 <a:solidFill>
                   <a:schemeClr val="tx1"/>
                 </a:solidFill>
                 <a:latin typeface="Times New Roman" panose="02020603050405020304" pitchFamily="18" charset="0"/>
                 <a:cs typeface="Times New Roman" panose="02020603050405020304" pitchFamily="18" charset="0"/>
               </a:rPr>
-              <a:t>Titolo</a:t>
-            </a:r>
+              <a:t>Nome</a:t>
+            </a:r>
+            <a:endParaRPr lang="it-IT" sz="1200" dirty="0">
+              <a:solidFill>
+                <a:schemeClr val="tx1"/>
+              </a:solidFill>
+              <a:latin typeface="Times New Roman" panose="02020603050405020304" pitchFamily="18" charset="0"/>
+              <a:cs typeface="Times New Roman" panose="02020603050405020304" pitchFamily="18" charset="0"/>
+            </a:endParaRPr>
           </a:p>
         </p:txBody>
       </p:sp>

</xml_diff>